<commit_message>
Notes from class on November 26, 2019
</commit_message>
<xml_diff>
--- a/Presentation/SOC5800_2019_Fall_Presentation.pptx
+++ b/Presentation/SOC5800_2019_Fall_Presentation.pptx
@@ -10,13 +10,14 @@
     <p:sldId id="258" r:id="rId4"/>
     <p:sldId id="259" r:id="rId5"/>
     <p:sldId id="260" r:id="rId6"/>
-    <p:sldId id="261" r:id="rId7"/>
-    <p:sldId id="262" r:id="rId8"/>
-    <p:sldId id="263" r:id="rId9"/>
-    <p:sldId id="264" r:id="rId10"/>
-    <p:sldId id="265" r:id="rId11"/>
-    <p:sldId id="266" r:id="rId12"/>
-    <p:sldId id="267" r:id="rId13"/>
+    <p:sldId id="268" r:id="rId7"/>
+    <p:sldId id="261" r:id="rId8"/>
+    <p:sldId id="262" r:id="rId9"/>
+    <p:sldId id="263" r:id="rId10"/>
+    <p:sldId id="264" r:id="rId11"/>
+    <p:sldId id="265" r:id="rId12"/>
+    <p:sldId id="266" r:id="rId13"/>
+    <p:sldId id="267" r:id="rId14"/>
   </p:sldIdLst>
   <p:sldSz cx="12192000" cy="6858000"/>
   <p:notesSz cx="6858000" cy="9144000"/>
@@ -252,7 +253,7 @@
           <a:p>
             <a:fld id="{28F64813-D1E7-44F4-A0BA-131F190214B0}" type="datetimeFigureOut">
               <a:rPr lang="en-US" smtClean="0"/>
-              <a:t>11/24/2019</a:t>
+              <a:t>11/26/2019</a:t>
             </a:fld>
             <a:endParaRPr lang="en-US"/>
           </a:p>
@@ -420,7 +421,7 @@
           <a:p>
             <a:fld id="{28F64813-D1E7-44F4-A0BA-131F190214B0}" type="datetimeFigureOut">
               <a:rPr lang="en-US" smtClean="0"/>
-              <a:t>11/24/2019</a:t>
+              <a:t>11/26/2019</a:t>
             </a:fld>
             <a:endParaRPr lang="en-US"/>
           </a:p>
@@ -598,7 +599,7 @@
           <a:p>
             <a:fld id="{28F64813-D1E7-44F4-A0BA-131F190214B0}" type="datetimeFigureOut">
               <a:rPr lang="en-US" smtClean="0"/>
-              <a:t>11/24/2019</a:t>
+              <a:t>11/26/2019</a:t>
             </a:fld>
             <a:endParaRPr lang="en-US"/>
           </a:p>
@@ -766,7 +767,7 @@
           <a:p>
             <a:fld id="{28F64813-D1E7-44F4-A0BA-131F190214B0}" type="datetimeFigureOut">
               <a:rPr lang="en-US" smtClean="0"/>
-              <a:t>11/24/2019</a:t>
+              <a:t>11/26/2019</a:t>
             </a:fld>
             <a:endParaRPr lang="en-US"/>
           </a:p>
@@ -1011,7 +1012,7 @@
           <a:p>
             <a:fld id="{28F64813-D1E7-44F4-A0BA-131F190214B0}" type="datetimeFigureOut">
               <a:rPr lang="en-US" smtClean="0"/>
-              <a:t>11/24/2019</a:t>
+              <a:t>11/26/2019</a:t>
             </a:fld>
             <a:endParaRPr lang="en-US"/>
           </a:p>
@@ -1240,7 +1241,7 @@
           <a:p>
             <a:fld id="{28F64813-D1E7-44F4-A0BA-131F190214B0}" type="datetimeFigureOut">
               <a:rPr lang="en-US" smtClean="0"/>
-              <a:t>11/24/2019</a:t>
+              <a:t>11/26/2019</a:t>
             </a:fld>
             <a:endParaRPr lang="en-US"/>
           </a:p>
@@ -1604,7 +1605,7 @@
           <a:p>
             <a:fld id="{28F64813-D1E7-44F4-A0BA-131F190214B0}" type="datetimeFigureOut">
               <a:rPr lang="en-US" smtClean="0"/>
-              <a:t>11/24/2019</a:t>
+              <a:t>11/26/2019</a:t>
             </a:fld>
             <a:endParaRPr lang="en-US"/>
           </a:p>
@@ -1721,7 +1722,7 @@
           <a:p>
             <a:fld id="{28F64813-D1E7-44F4-A0BA-131F190214B0}" type="datetimeFigureOut">
               <a:rPr lang="en-US" smtClean="0"/>
-              <a:t>11/24/2019</a:t>
+              <a:t>11/26/2019</a:t>
             </a:fld>
             <a:endParaRPr lang="en-US"/>
           </a:p>
@@ -1816,7 +1817,7 @@
           <a:p>
             <a:fld id="{28F64813-D1E7-44F4-A0BA-131F190214B0}" type="datetimeFigureOut">
               <a:rPr lang="en-US" smtClean="0"/>
-              <a:t>11/24/2019</a:t>
+              <a:t>11/26/2019</a:t>
             </a:fld>
             <a:endParaRPr lang="en-US"/>
           </a:p>
@@ -2091,7 +2092,7 @@
           <a:p>
             <a:fld id="{28F64813-D1E7-44F4-A0BA-131F190214B0}" type="datetimeFigureOut">
               <a:rPr lang="en-US" smtClean="0"/>
-              <a:t>11/24/2019</a:t>
+              <a:t>11/26/2019</a:t>
             </a:fld>
             <a:endParaRPr lang="en-US"/>
           </a:p>
@@ -2343,7 +2344,7 @@
           <a:p>
             <a:fld id="{28F64813-D1E7-44F4-A0BA-131F190214B0}" type="datetimeFigureOut">
               <a:rPr lang="en-US" smtClean="0"/>
-              <a:t>11/24/2019</a:t>
+              <a:t>11/26/2019</a:t>
             </a:fld>
             <a:endParaRPr lang="en-US"/>
           </a:p>
@@ -2554,7 +2555,7 @@
           <a:p>
             <a:fld id="{28F64813-D1E7-44F4-A0BA-131F190214B0}" type="datetimeFigureOut">
               <a:rPr lang="en-US" smtClean="0"/>
-              <a:t>11/24/2019</a:t>
+              <a:t>11/26/2019</a:t>
             </a:fld>
             <a:endParaRPr lang="en-US"/>
           </a:p>
@@ -3114,6 +3115,97 @@
           <a:chExt cx="0" cy="0"/>
         </a:xfrm>
       </p:grpSpPr>
+      <p:pic>
+        <p:nvPicPr>
+          <p:cNvPr id="2" name="Picture 1"/>
+          <p:cNvPicPr preferRelativeResize="0">
+            <a:picLocks noChangeAspect="1"/>
+          </p:cNvPicPr>
+          <p:nvPr/>
+        </p:nvPicPr>
+        <p:blipFill>
+          <a:blip r:embed="rId2"/>
+          <a:stretch>
+            <a:fillRect/>
+          </a:stretch>
+        </p:blipFill>
+        <p:spPr>
+          <a:xfrm>
+            <a:off x="1251517" y="1637730"/>
+            <a:ext cx="9688967" cy="2866029"/>
+          </a:xfrm>
+          <a:prstGeom prst="rect">
+            <a:avLst/>
+          </a:prstGeom>
+        </p:spPr>
+      </p:pic>
+      <p:sp>
+        <p:nvSpPr>
+          <p:cNvPr id="3" name="Rectangle 2"/>
+          <p:cNvSpPr/>
+          <p:nvPr/>
+        </p:nvSpPr>
+        <p:spPr>
+          <a:xfrm>
+            <a:off x="2817090" y="457200"/>
+            <a:ext cx="6557821" cy="400110"/>
+          </a:xfrm>
+          <a:prstGeom prst="rect">
+            <a:avLst/>
+          </a:prstGeom>
+        </p:spPr>
+        <p:txBody>
+          <a:bodyPr wrap="none">
+            <a:spAutoFit/>
+          </a:bodyPr>
+          <a:lstStyle/>
+          <a:p>
+            <a:pPr algn="ctr"/>
+            <a:r>
+              <a:rPr lang="en-US" sz="2000" dirty="0"/>
+              <a:t>Table 3. Analysis of Variance of `</a:t>
+            </a:r>
+            <a:r>
+              <a:rPr lang="en-US" sz="2000" dirty="0" err="1"/>
+              <a:t>gritScore</a:t>
+            </a:r>
+            <a:r>
+              <a:rPr lang="en-US" sz="2000" dirty="0"/>
+              <a:t>` by `savings` groups </a:t>
+            </a:r>
+          </a:p>
+        </p:txBody>
+      </p:sp>
+    </p:spTree>
+    <p:extLst>
+      <p:ext uri="{BB962C8B-B14F-4D97-AF65-F5344CB8AC3E}">
+        <p14:creationId xmlns:p14="http://schemas.microsoft.com/office/powerpoint/2010/main" val="3796738035"/>
+      </p:ext>
+    </p:extLst>
+  </p:cSld>
+  <p:clrMapOvr>
+    <a:masterClrMapping/>
+  </p:clrMapOvr>
+</p:sld>
+</file>
+
+<file path=ppt/slides/slide11.xml><?xml version="1.0" encoding="utf-8"?>
+<p:sld xmlns:a="http://schemas.openxmlformats.org/drawingml/2006/main" xmlns:r="http://schemas.openxmlformats.org/officeDocument/2006/relationships" xmlns:p="http://schemas.openxmlformats.org/presentationml/2006/main">
+  <p:cSld>
+    <p:spTree>
+      <p:nvGrpSpPr>
+        <p:cNvPr id="1" name=""/>
+        <p:cNvGrpSpPr/>
+        <p:nvPr/>
+      </p:nvGrpSpPr>
+      <p:grpSpPr>
+        <a:xfrm>
+          <a:off x="0" y="0"/>
+          <a:ext cx="0" cy="0"/>
+          <a:chOff x="0" y="0"/>
+          <a:chExt cx="0" cy="0"/>
+        </a:xfrm>
+      </p:grpSpPr>
       <p:sp>
         <p:nvSpPr>
           <p:cNvPr id="2" name="Rectangle 1"/>
@@ -3501,7 +3593,7 @@
 </p:sld>
 </file>
 
-<file path=ppt/slides/slide11.xml><?xml version="1.0" encoding="utf-8"?>
+<file path=ppt/slides/slide12.xml><?xml version="1.0" encoding="utf-8"?>
 <p:sld xmlns:a="http://schemas.openxmlformats.org/drawingml/2006/main" xmlns:r="http://schemas.openxmlformats.org/officeDocument/2006/relationships" xmlns:p="http://schemas.openxmlformats.org/presentationml/2006/main">
   <p:cSld>
     <p:spTree>
@@ -3820,7 +3912,7 @@
 </p:sld>
 </file>
 
-<file path=ppt/slides/slide12.xml><?xml version="1.0" encoding="utf-8"?>
+<file path=ppt/slides/slide13.xml><?xml version="1.0" encoding="utf-8"?>
 <p:sld xmlns:a="http://schemas.openxmlformats.org/drawingml/2006/main" xmlns:r="http://schemas.openxmlformats.org/officeDocument/2006/relationships" xmlns:p="http://schemas.openxmlformats.org/presentationml/2006/main">
   <p:cSld>
     <p:spTree>
@@ -4677,6 +4769,247 @@
           <p:nvPr/>
         </p:nvPicPr>
         <p:blipFill>
+          <a:blip r:embed="rId2">
+            <a:extLst>
+              <a:ext uri="{28A0092B-C50C-407E-A947-70E740481C1C}">
+                <a14:useLocalDpi xmlns:a14="http://schemas.microsoft.com/office/drawing/2010/main" val="0"/>
+              </a:ext>
+            </a:extLst>
+          </a:blip>
+          <a:stretch>
+            <a:fillRect/>
+          </a:stretch>
+        </p:blipFill>
+        <p:spPr>
+          <a:xfrm>
+            <a:off x="1035065" y="417708"/>
+            <a:ext cx="3681825" cy="2743200"/>
+          </a:xfrm>
+          <a:prstGeom prst="rect">
+            <a:avLst/>
+          </a:prstGeom>
+          <a:ln>
+            <a:solidFill>
+              <a:schemeClr val="bg1">
+                <a:lumMod val="75000"/>
+              </a:schemeClr>
+            </a:solidFill>
+          </a:ln>
+        </p:spPr>
+      </p:pic>
+      <p:pic>
+        <p:nvPicPr>
+          <p:cNvPr id="3" name="Picture 2"/>
+          <p:cNvPicPr>
+            <a:picLocks noChangeAspect="1"/>
+          </p:cNvPicPr>
+          <p:nvPr/>
+        </p:nvPicPr>
+        <p:blipFill>
+          <a:blip r:embed="rId3">
+            <a:extLst>
+              <a:ext uri="{28A0092B-C50C-407E-A947-70E740481C1C}">
+                <a14:useLocalDpi xmlns:a14="http://schemas.microsoft.com/office/drawing/2010/main" val="0"/>
+              </a:ext>
+            </a:extLst>
+          </a:blip>
+          <a:stretch>
+            <a:fillRect/>
+          </a:stretch>
+        </p:blipFill>
+        <p:spPr>
+          <a:xfrm>
+            <a:off x="4835031" y="417708"/>
+            <a:ext cx="2323966" cy="3291840"/>
+          </a:xfrm>
+          <a:prstGeom prst="rect">
+            <a:avLst/>
+          </a:prstGeom>
+          <a:ln>
+            <a:solidFill>
+              <a:schemeClr val="bg1">
+                <a:lumMod val="75000"/>
+              </a:schemeClr>
+            </a:solidFill>
+          </a:ln>
+        </p:spPr>
+      </p:pic>
+      <p:pic>
+        <p:nvPicPr>
+          <p:cNvPr id="4" name="Picture 3"/>
+          <p:cNvPicPr>
+            <a:picLocks noChangeAspect="1"/>
+          </p:cNvPicPr>
+          <p:nvPr/>
+        </p:nvPicPr>
+        <p:blipFill>
+          <a:blip r:embed="rId4">
+            <a:extLst>
+              <a:ext uri="{28A0092B-C50C-407E-A947-70E740481C1C}">
+                <a14:useLocalDpi xmlns:a14="http://schemas.microsoft.com/office/drawing/2010/main" val="0"/>
+              </a:ext>
+            </a:extLst>
+          </a:blip>
+          <a:stretch>
+            <a:fillRect/>
+          </a:stretch>
+        </p:blipFill>
+        <p:spPr>
+          <a:xfrm>
+            <a:off x="7277138" y="417708"/>
+            <a:ext cx="4781280" cy="2651760"/>
+          </a:xfrm>
+          <a:prstGeom prst="rect">
+            <a:avLst/>
+          </a:prstGeom>
+        </p:spPr>
+      </p:pic>
+      <p:pic>
+        <p:nvPicPr>
+          <p:cNvPr id="5" name="Picture 4"/>
+          <p:cNvPicPr>
+            <a:picLocks noChangeAspect="1"/>
+          </p:cNvPicPr>
+          <p:nvPr/>
+        </p:nvPicPr>
+        <p:blipFill>
+          <a:blip r:embed="rId5">
+            <a:extLst>
+              <a:ext uri="{28A0092B-C50C-407E-A947-70E740481C1C}">
+                <a14:useLocalDpi xmlns:a14="http://schemas.microsoft.com/office/drawing/2010/main" val="0"/>
+              </a:ext>
+            </a:extLst>
+          </a:blip>
+          <a:stretch>
+            <a:fillRect/>
+          </a:stretch>
+        </p:blipFill>
+        <p:spPr>
+          <a:xfrm>
+            <a:off x="1035065" y="3961339"/>
+            <a:ext cx="4572000" cy="2286000"/>
+          </a:xfrm>
+          <a:prstGeom prst="rect">
+            <a:avLst/>
+          </a:prstGeom>
+        </p:spPr>
+      </p:pic>
+      <p:pic>
+        <p:nvPicPr>
+          <p:cNvPr id="7" name="Picture 6"/>
+          <p:cNvPicPr>
+            <a:picLocks noChangeAspect="1"/>
+          </p:cNvPicPr>
+          <p:nvPr/>
+        </p:nvPicPr>
+        <p:blipFill>
+          <a:blip r:embed="rId6"/>
+          <a:stretch>
+            <a:fillRect/>
+          </a:stretch>
+        </p:blipFill>
+        <p:spPr>
+          <a:xfrm>
+            <a:off x="7670875" y="3709548"/>
+            <a:ext cx="2188396" cy="1371600"/>
+          </a:xfrm>
+          <a:prstGeom prst="rect">
+            <a:avLst/>
+          </a:prstGeom>
+        </p:spPr>
+      </p:pic>
+      <p:pic>
+        <p:nvPicPr>
+          <p:cNvPr id="8" name="Picture 7"/>
+          <p:cNvPicPr>
+            <a:picLocks noChangeAspect="1"/>
+          </p:cNvPicPr>
+          <p:nvPr/>
+        </p:nvPicPr>
+        <p:blipFill>
+          <a:blip r:embed="rId7">
+            <a:extLst>
+              <a:ext uri="{28A0092B-C50C-407E-A947-70E740481C1C}">
+                <a14:useLocalDpi xmlns:a14="http://schemas.microsoft.com/office/drawing/2010/main" val="0"/>
+              </a:ext>
+            </a:extLst>
+          </a:blip>
+          <a:stretch>
+            <a:fillRect/>
+          </a:stretch>
+        </p:blipFill>
+        <p:spPr>
+          <a:xfrm>
+            <a:off x="10085272" y="3275539"/>
+            <a:ext cx="1828800" cy="1828800"/>
+          </a:xfrm>
+          <a:prstGeom prst="rect">
+            <a:avLst/>
+          </a:prstGeom>
+        </p:spPr>
+      </p:pic>
+      <p:pic>
+        <p:nvPicPr>
+          <p:cNvPr id="9" name="Picture 8"/>
+          <p:cNvPicPr>
+            <a:picLocks noChangeAspect="1"/>
+          </p:cNvPicPr>
+          <p:nvPr/>
+        </p:nvPicPr>
+        <p:blipFill rotWithShape="1">
+          <a:blip r:embed="rId8"/>
+          <a:srcRect t="12377"/>
+          <a:stretch/>
+        </p:blipFill>
+        <p:spPr>
+          <a:xfrm>
+            <a:off x="9169445" y="5152443"/>
+            <a:ext cx="1600200" cy="1602452"/>
+          </a:xfrm>
+          <a:prstGeom prst="rect">
+            <a:avLst/>
+          </a:prstGeom>
+        </p:spPr>
+      </p:pic>
+    </p:spTree>
+    <p:extLst>
+      <p:ext uri="{BB962C8B-B14F-4D97-AF65-F5344CB8AC3E}">
+        <p14:creationId xmlns:p14="http://schemas.microsoft.com/office/powerpoint/2010/main" val="2878829234"/>
+      </p:ext>
+    </p:extLst>
+  </p:cSld>
+  <p:clrMapOvr>
+    <a:masterClrMapping/>
+  </p:clrMapOvr>
+</p:sld>
+</file>
+
+<file path=ppt/slides/slide7.xml><?xml version="1.0" encoding="utf-8"?>
+<p:sld xmlns:a="http://schemas.openxmlformats.org/drawingml/2006/main" xmlns:r="http://schemas.openxmlformats.org/officeDocument/2006/relationships" xmlns:p="http://schemas.openxmlformats.org/presentationml/2006/main">
+  <p:cSld>
+    <p:spTree>
+      <p:nvGrpSpPr>
+        <p:cNvPr id="1" name=""/>
+        <p:cNvGrpSpPr/>
+        <p:nvPr/>
+      </p:nvGrpSpPr>
+      <p:grpSpPr>
+        <a:xfrm>
+          <a:off x="0" y="0"/>
+          <a:ext cx="0" cy="0"/>
+          <a:chOff x="0" y="0"/>
+          <a:chExt cx="0" cy="0"/>
+        </a:xfrm>
+      </p:grpSpPr>
+      <p:pic>
+        <p:nvPicPr>
+          <p:cNvPr id="2" name="Picture 1"/>
+          <p:cNvPicPr>
+            <a:picLocks noChangeAspect="1"/>
+          </p:cNvPicPr>
+          <p:nvPr/>
+        </p:nvPicPr>
+        <p:blipFill>
           <a:blip r:embed="rId2"/>
           <a:stretch>
             <a:fillRect/>
@@ -4766,7 +5099,7 @@
 </p:sld>
 </file>
 
-<file path=ppt/slides/slide7.xml><?xml version="1.0" encoding="utf-8"?>
+<file path=ppt/slides/slide8.xml><?xml version="1.0" encoding="utf-8"?>
 <p:sld xmlns:a="http://schemas.openxmlformats.org/drawingml/2006/main" xmlns:r="http://schemas.openxmlformats.org/officeDocument/2006/relationships" xmlns:p="http://schemas.openxmlformats.org/presentationml/2006/main">
   <p:cSld>
     <p:spTree>
@@ -7701,7 +8034,7 @@
 </p:sld>
 </file>
 
-<file path=ppt/slides/slide8.xml><?xml version="1.0" encoding="utf-8"?>
+<file path=ppt/slides/slide9.xml><?xml version="1.0" encoding="utf-8"?>
 <p:sld xmlns:a="http://schemas.openxmlformats.org/drawingml/2006/main" xmlns:r="http://schemas.openxmlformats.org/officeDocument/2006/relationships" xmlns:p="http://schemas.openxmlformats.org/presentationml/2006/main">
   <p:cSld>
     <p:spTree>
@@ -16377,97 +16710,6 @@
     <p:extLst>
       <p:ext uri="{BB962C8B-B14F-4D97-AF65-F5344CB8AC3E}">
         <p14:creationId xmlns:p14="http://schemas.microsoft.com/office/powerpoint/2010/main" val="30550172"/>
-      </p:ext>
-    </p:extLst>
-  </p:cSld>
-  <p:clrMapOvr>
-    <a:masterClrMapping/>
-  </p:clrMapOvr>
-</p:sld>
-</file>
-
-<file path=ppt/slides/slide9.xml><?xml version="1.0" encoding="utf-8"?>
-<p:sld xmlns:a="http://schemas.openxmlformats.org/drawingml/2006/main" xmlns:r="http://schemas.openxmlformats.org/officeDocument/2006/relationships" xmlns:p="http://schemas.openxmlformats.org/presentationml/2006/main">
-  <p:cSld>
-    <p:spTree>
-      <p:nvGrpSpPr>
-        <p:cNvPr id="1" name=""/>
-        <p:cNvGrpSpPr/>
-        <p:nvPr/>
-      </p:nvGrpSpPr>
-      <p:grpSpPr>
-        <a:xfrm>
-          <a:off x="0" y="0"/>
-          <a:ext cx="0" cy="0"/>
-          <a:chOff x="0" y="0"/>
-          <a:chExt cx="0" cy="0"/>
-        </a:xfrm>
-      </p:grpSpPr>
-      <p:pic>
-        <p:nvPicPr>
-          <p:cNvPr id="2" name="Picture 1"/>
-          <p:cNvPicPr preferRelativeResize="0">
-            <a:picLocks noChangeAspect="1"/>
-          </p:cNvPicPr>
-          <p:nvPr/>
-        </p:nvPicPr>
-        <p:blipFill>
-          <a:blip r:embed="rId2"/>
-          <a:stretch>
-            <a:fillRect/>
-          </a:stretch>
-        </p:blipFill>
-        <p:spPr>
-          <a:xfrm>
-            <a:off x="1251517" y="1637730"/>
-            <a:ext cx="9688967" cy="2866029"/>
-          </a:xfrm>
-          <a:prstGeom prst="rect">
-            <a:avLst/>
-          </a:prstGeom>
-        </p:spPr>
-      </p:pic>
-      <p:sp>
-        <p:nvSpPr>
-          <p:cNvPr id="3" name="Rectangle 2"/>
-          <p:cNvSpPr/>
-          <p:nvPr/>
-        </p:nvSpPr>
-        <p:spPr>
-          <a:xfrm>
-            <a:off x="2817090" y="457200"/>
-            <a:ext cx="6557821" cy="400110"/>
-          </a:xfrm>
-          <a:prstGeom prst="rect">
-            <a:avLst/>
-          </a:prstGeom>
-        </p:spPr>
-        <p:txBody>
-          <a:bodyPr wrap="none">
-            <a:spAutoFit/>
-          </a:bodyPr>
-          <a:lstStyle/>
-          <a:p>
-            <a:pPr algn="ctr"/>
-            <a:r>
-              <a:rPr lang="en-US" sz="2000" dirty="0"/>
-              <a:t>Table 3. Analysis of Variance of `</a:t>
-            </a:r>
-            <a:r>
-              <a:rPr lang="en-US" sz="2000" dirty="0" err="1"/>
-              <a:t>gritScore</a:t>
-            </a:r>
-            <a:r>
-              <a:rPr lang="en-US" sz="2000" dirty="0"/>
-              <a:t>` by `savings` groups </a:t>
-            </a:r>
-          </a:p>
-        </p:txBody>
-      </p:sp>
-    </p:spTree>
-    <p:extLst>
-      <p:ext uri="{BB962C8B-B14F-4D97-AF65-F5344CB8AC3E}">
-        <p14:creationId xmlns:p14="http://schemas.microsoft.com/office/powerpoint/2010/main" val="3796738035"/>
       </p:ext>
     </p:extLst>
   </p:cSld>

</xml_diff>